<commit_message>
Change find_replace to variable substitution with additional format for Bible verse and datetime.
</commit_message>
<xml_diff>
--- a/sample/Service-Template.pptx
+++ b/sample/Service-Template.pptx
@@ -360,7 +360,7 @@
               <a:pPr>
                 <a:defRPr/>
               </a:pPr>
-              <a:t>9/13/2020</a:t>
+              <a:t>5/7/2021</a:t>
             </a:fld>
             <a:endParaRPr lang="en-US" dirty="0">
               <a:latin typeface="나눔고딕" panose="020D0604000000000000" pitchFamily="50" charset="-127"/>
@@ -6781,7 +6781,7 @@
               <a:pPr>
                 <a:defRPr/>
               </a:pPr>
-              <a:t>2020-09-13</a:t>
+              <a:t>2021-05-07</a:t>
             </a:fld>
             <a:endParaRPr lang="ko-KR" altLang="en-US"/>
           </a:p>
@@ -6989,7 +6989,7 @@
               <a:pPr>
                 <a:defRPr/>
               </a:pPr>
-              <a:t>2020-09-13</a:t>
+              <a:t>2021-05-07</a:t>
             </a:fld>
             <a:endParaRPr lang="ko-KR" altLang="en-US"/>
           </a:p>
@@ -7274,7 +7274,7 @@
               <a:pPr>
                 <a:defRPr/>
               </a:pPr>
-              <a:t>2020-09-13</a:t>
+              <a:t>2021-05-07</a:t>
             </a:fld>
             <a:endParaRPr lang="ko-KR" altLang="en-US"/>
           </a:p>
@@ -7599,7 +7599,7 @@
               <a:pPr>
                 <a:defRPr/>
               </a:pPr>
-              <a:t>2020-09-13</a:t>
+              <a:t>2021-05-07</a:t>
             </a:fld>
             <a:endParaRPr lang="ko-KR" altLang="en-US"/>
           </a:p>
@@ -8058,7 +8058,7 @@
               <a:pPr>
                 <a:defRPr/>
               </a:pPr>
-              <a:t>2020-09-13</a:t>
+              <a:t>2021-05-07</a:t>
             </a:fld>
             <a:endParaRPr lang="ko-KR" altLang="en-US"/>
           </a:p>
@@ -8215,7 +8215,7 @@
               <a:pPr>
                 <a:defRPr/>
               </a:pPr>
-              <a:t>2020-09-13</a:t>
+              <a:t>2021-05-07</a:t>
             </a:fld>
             <a:endParaRPr lang="ko-KR" altLang="en-US"/>
           </a:p>
@@ -8350,7 +8350,7 @@
               <a:pPr>
                 <a:defRPr/>
               </a:pPr>
-              <a:t>2020-09-13</a:t>
+              <a:t>2021-05-07</a:t>
             </a:fld>
             <a:endParaRPr lang="ko-KR" altLang="en-US"/>
           </a:p>
@@ -8665,7 +8665,7 @@
               <a:pPr>
                 <a:defRPr/>
               </a:pPr>
-              <a:t>2020-09-13</a:t>
+              <a:t>2021-05-07</a:t>
             </a:fld>
             <a:endParaRPr lang="ko-KR" altLang="en-US"/>
           </a:p>
@@ -9171,7 +9171,7 @@
               <a:pPr>
                 <a:defRPr/>
               </a:pPr>
-              <a:t>2020-09-13</a:t>
+              <a:t>2021-05-07</a:t>
             </a:fld>
             <a:endParaRPr lang="ko-KR" altLang="en-US"/>
           </a:p>
@@ -9379,7 +9379,7 @@
               <a:pPr>
                 <a:defRPr/>
               </a:pPr>
-              <a:t>2020-09-13</a:t>
+              <a:t>2021-05-07</a:t>
             </a:fld>
             <a:endParaRPr lang="ko-KR" altLang="en-US"/>
           </a:p>
@@ -9597,7 +9597,7 @@
               <a:pPr>
                 <a:defRPr/>
               </a:pPr>
-              <a:t>2020-09-13</a:t>
+              <a:t>2021-05-07</a:t>
             </a:fld>
             <a:endParaRPr lang="ko-KR" altLang="en-US"/>
           </a:p>
@@ -9829,7 +9829,7 @@
           <a:p>
             <a:fld id="{B29C744B-1D75-45B0-B92E-93127D5658A4}" type="datetimeFigureOut">
               <a:rPr lang="en-US" smtClean="0"/>
-              <a:t>9/13/2020</a:t>
+              <a:t>5/7/2021</a:t>
             </a:fld>
             <a:endParaRPr lang="en-US"/>
           </a:p>
@@ -10027,7 +10027,7 @@
           <a:p>
             <a:fld id="{B29C744B-1D75-45B0-B92E-93127D5658A4}" type="datetimeFigureOut">
               <a:rPr lang="en-US" smtClean="0"/>
-              <a:t>9/13/2020</a:t>
+              <a:t>5/7/2021</a:t>
             </a:fld>
             <a:endParaRPr lang="en-US"/>
           </a:p>
@@ -10302,7 +10302,7 @@
           <a:p>
             <a:fld id="{B29C744B-1D75-45B0-B92E-93127D5658A4}" type="datetimeFigureOut">
               <a:rPr lang="en-US" smtClean="0"/>
-              <a:t>9/13/2020</a:t>
+              <a:t>5/7/2021</a:t>
             </a:fld>
             <a:endParaRPr lang="en-US"/>
           </a:p>
@@ -10567,7 +10567,7 @@
           <a:p>
             <a:fld id="{B29C744B-1D75-45B0-B92E-93127D5658A4}" type="datetimeFigureOut">
               <a:rPr lang="en-US" smtClean="0"/>
-              <a:t>9/13/2020</a:t>
+              <a:t>5/7/2021</a:t>
             </a:fld>
             <a:endParaRPr lang="en-US"/>
           </a:p>
@@ -10979,7 +10979,7 @@
           <a:p>
             <a:fld id="{B29C744B-1D75-45B0-B92E-93127D5658A4}" type="datetimeFigureOut">
               <a:rPr lang="en-US" smtClean="0"/>
-              <a:t>9/13/2020</a:t>
+              <a:t>5/7/2021</a:t>
             </a:fld>
             <a:endParaRPr lang="en-US"/>
           </a:p>
@@ -11120,7 +11120,7 @@
           <a:p>
             <a:fld id="{B29C744B-1D75-45B0-B92E-93127D5658A4}" type="datetimeFigureOut">
               <a:rPr lang="en-US" smtClean="0"/>
-              <a:t>9/13/2020</a:t>
+              <a:t>5/7/2021</a:t>
             </a:fld>
             <a:endParaRPr lang="en-US"/>
           </a:p>
@@ -11233,7 +11233,7 @@
           <a:p>
             <a:fld id="{B29C744B-1D75-45B0-B92E-93127D5658A4}" type="datetimeFigureOut">
               <a:rPr lang="en-US" smtClean="0"/>
-              <a:t>9/13/2020</a:t>
+              <a:t>5/7/2021</a:t>
             </a:fld>
             <a:endParaRPr lang="en-US"/>
           </a:p>
@@ -11778,7 +11778,7 @@
           <a:p>
             <a:fld id="{B29C744B-1D75-45B0-B92E-93127D5658A4}" type="datetimeFigureOut">
               <a:rPr lang="en-US" smtClean="0"/>
-              <a:t>9/13/2020</a:t>
+              <a:t>5/7/2021</a:t>
             </a:fld>
             <a:endParaRPr lang="en-US"/>
           </a:p>
@@ -12066,7 +12066,7 @@
           <a:p>
             <a:fld id="{B29C744B-1D75-45B0-B92E-93127D5658A4}" type="datetimeFigureOut">
               <a:rPr lang="en-US" smtClean="0"/>
-              <a:t>9/13/2020</a:t>
+              <a:t>5/7/2021</a:t>
             </a:fld>
             <a:endParaRPr lang="en-US"/>
           </a:p>
@@ -12264,7 +12264,7 @@
           <a:p>
             <a:fld id="{B29C744B-1D75-45B0-B92E-93127D5658A4}" type="datetimeFigureOut">
               <a:rPr lang="en-US" smtClean="0"/>
-              <a:t>9/13/2020</a:t>
+              <a:t>5/7/2021</a:t>
             </a:fld>
             <a:endParaRPr lang="en-US"/>
           </a:p>
@@ -12472,7 +12472,7 @@
           <a:p>
             <a:fld id="{B29C744B-1D75-45B0-B92E-93127D5658A4}" type="datetimeFigureOut">
               <a:rPr lang="en-US" smtClean="0"/>
-              <a:t>9/13/2020</a:t>
+              <a:t>5/7/2021</a:t>
             </a:fld>
             <a:endParaRPr lang="en-US"/>
           </a:p>
@@ -15237,7 +15237,7 @@
               <a:pPr>
                 <a:defRPr/>
               </a:pPr>
-              <a:t>2020-09-13</a:t>
+              <a:t>2021-05-07</a:t>
             </a:fld>
             <a:endParaRPr lang="ko-KR" altLang="en-US" dirty="0"/>
           </a:p>
@@ -15994,7 +15994,7 @@
             <a:fld id="{B29C744B-1D75-45B0-B92E-93127D5658A4}" type="datetimeFigureOut">
               <a:rPr lang="en-US" smtClean="0"/>
               <a:pPr/>
-              <a:t>9/13/2020</a:t>
+              <a:t>5/7/2021</a:t>
             </a:fld>
             <a:endParaRPr lang="en-US" dirty="0"/>
           </a:p>
@@ -16536,7 +16536,7 @@
               <a:defRPr/>
             </a:pPr>
             <a:r>
-              <a:rPr kumimoji="1" lang="en-US" altLang="ko-KR" sz="3200" b="1" i="0" u="none" strike="noStrike" kern="0" cap="none" spc="0" normalizeH="0" baseline="0" noProof="0" dirty="0" err="1">
+              <a:rPr kumimoji="1" lang="en-US" altLang="ko-KR" sz="3200" b="1" i="0" u="none" strike="noStrike" kern="0" cap="none" spc="0" normalizeH="0" baseline="0" noProof="0" dirty="0">
                 <a:ln w="19050">
                   <a:noFill/>
                 </a:ln>
@@ -16550,22 +16550,42 @@
                 <a:ea typeface="나눔고딕" panose="020D0604000000000000" pitchFamily="50" charset="-127"/>
                 <a:cs typeface="Arial" pitchFamily="34" charset="0"/>
               </a:rPr>
-              <a:t>MK_service_title</a:t>
-            </a:r>
-            <a:endParaRPr kumimoji="1" lang="en-US" altLang="ko-KR" sz="3200" b="1" i="0" u="none" strike="noStrike" kern="0" cap="none" spc="0" normalizeH="0" baseline="0" noProof="0" dirty="0">
-              <a:ln w="19050">
-                <a:noFill/>
-              </a:ln>
-              <a:solidFill>
-                <a:srgbClr val="FFC000"/>
-              </a:solidFill>
-              <a:effectLst/>
-              <a:uLnTx/>
-              <a:uFillTx/>
-              <a:latin typeface="나눔고딕" panose="020D0604000000000000" pitchFamily="50" charset="-127"/>
-              <a:ea typeface="나눔고딕" panose="020D0604000000000000" pitchFamily="50" charset="-127"/>
-              <a:cs typeface="Arial" pitchFamily="34" charset="0"/>
-            </a:endParaRPr>
+              <a:t>{</a:t>
+            </a:r>
+            <a:r>
+              <a:rPr kumimoji="1" lang="en-US" altLang="ko-KR" sz="3200" b="1" i="0" u="none" strike="noStrike" kern="0" cap="none" spc="0" normalizeH="0" baseline="0" noProof="0" dirty="0" err="1">
+                <a:ln w="19050">
+                  <a:noFill/>
+                </a:ln>
+                <a:solidFill>
+                  <a:srgbClr val="FFC000"/>
+                </a:solidFill>
+                <a:effectLst/>
+                <a:uLnTx/>
+                <a:uFillTx/>
+                <a:latin typeface="나눔고딕" panose="020D0604000000000000" pitchFamily="50" charset="-127"/>
+                <a:ea typeface="나눔고딕" panose="020D0604000000000000" pitchFamily="50" charset="-127"/>
+                <a:cs typeface="Arial" pitchFamily="34" charset="0"/>
+              </a:rPr>
+              <a:t>service_title</a:t>
+            </a:r>
+            <a:r>
+              <a:rPr kumimoji="1" lang="en-US" altLang="ko-KR" sz="3200" b="1" i="0" u="none" strike="noStrike" kern="0" cap="none" spc="0" normalizeH="0" baseline="0" noProof="0" dirty="0">
+                <a:ln w="19050">
+                  <a:noFill/>
+                </a:ln>
+                <a:solidFill>
+                  <a:srgbClr val="FFC000"/>
+                </a:solidFill>
+                <a:effectLst/>
+                <a:uLnTx/>
+                <a:uFillTx/>
+                <a:latin typeface="나눔고딕" panose="020D0604000000000000" pitchFamily="50" charset="-127"/>
+                <a:ea typeface="나눔고딕" panose="020D0604000000000000" pitchFamily="50" charset="-127"/>
+                <a:cs typeface="Arial" pitchFamily="34" charset="0"/>
+              </a:rPr>
+              <a:t>}</a:t>
+            </a:r>
           </a:p>
         </p:txBody>
       </p:sp>
@@ -16614,7 +16634,7 @@
               <a:defRPr/>
             </a:pPr>
             <a:r>
-              <a:rPr kumimoji="1" lang="en-US" altLang="ko-KR" sz="4800" b="1" i="0" u="none" strike="noStrike" kern="1200" cap="none" spc="0" normalizeH="0" baseline="0" noProof="0" dirty="0" err="1">
+              <a:rPr kumimoji="1" lang="en-US" altLang="ko-KR" sz="4800" b="1" i="0" u="none" strike="noStrike" kern="1200" cap="none" spc="0" normalizeH="0" baseline="0" noProof="0" dirty="0">
                 <a:ln w="19050">
                   <a:noFill/>
                 </a:ln>
@@ -16630,24 +16650,46 @@
                 <a:ea typeface="나눔고딕" panose="020D0604000000000000" pitchFamily="50" charset="-127"/>
                 <a:cs typeface="Arial" pitchFamily="34" charset="0"/>
               </a:rPr>
-              <a:t>MK_sermon_title</a:t>
-            </a:r>
-            <a:endParaRPr kumimoji="1" lang="en-US" altLang="ko-KR" sz="4800" b="1" i="0" u="none" strike="noStrike" kern="1200" cap="none" spc="0" normalizeH="0" baseline="0" noProof="0" dirty="0">
-              <a:ln w="19050">
-                <a:noFill/>
-              </a:ln>
-              <a:solidFill>
-                <a:srgbClr val="FFFFFF">
-                  <a:lumMod val="95000"/>
-                </a:srgbClr>
-              </a:solidFill>
-              <a:effectLst/>
-              <a:uLnTx/>
-              <a:uFillTx/>
-              <a:latin typeface="나눔고딕" panose="020D0604000000000000" pitchFamily="50" charset="-127"/>
-              <a:ea typeface="나눔고딕" panose="020D0604000000000000" pitchFamily="50" charset="-127"/>
-              <a:cs typeface="Arial" pitchFamily="34" charset="0"/>
-            </a:endParaRPr>
+              <a:t>{</a:t>
+            </a:r>
+            <a:r>
+              <a:rPr kumimoji="1" lang="en-US" altLang="ko-KR" sz="4800" b="1" i="0" u="none" strike="noStrike" kern="1200" cap="none" spc="0" normalizeH="0" baseline="0" noProof="0" dirty="0" err="1">
+                <a:ln w="19050">
+                  <a:noFill/>
+                </a:ln>
+                <a:solidFill>
+                  <a:srgbClr val="FFFFFF">
+                    <a:lumMod val="95000"/>
+                  </a:srgbClr>
+                </a:solidFill>
+                <a:effectLst/>
+                <a:uLnTx/>
+                <a:uFillTx/>
+                <a:latin typeface="나눔고딕" panose="020D0604000000000000" pitchFamily="50" charset="-127"/>
+                <a:ea typeface="나눔고딕" panose="020D0604000000000000" pitchFamily="50" charset="-127"/>
+                <a:cs typeface="Arial" pitchFamily="34" charset="0"/>
+              </a:rPr>
+              <a:t>sermon_title</a:t>
+            </a:r>
+            <a:r>
+              <a:rPr kumimoji="1" lang="en-US" altLang="ko-KR" sz="4800" b="1" i="0" u="none" strike="noStrike" kern="1200" cap="none" spc="0" normalizeH="0" baseline="0" noProof="0" dirty="0">
+                <a:ln w="19050">
+                  <a:noFill/>
+                </a:ln>
+                <a:solidFill>
+                  <a:srgbClr val="FFFFFF">
+                    <a:lumMod val="95000"/>
+                  </a:srgbClr>
+                </a:solidFill>
+                <a:effectLst/>
+                <a:uLnTx/>
+                <a:uFillTx/>
+                <a:latin typeface="나눔고딕" panose="020D0604000000000000" pitchFamily="50" charset="-127"/>
+                <a:ea typeface="나눔고딕" panose="020D0604000000000000" pitchFamily="50" charset="-127"/>
+                <a:cs typeface="Arial" pitchFamily="34" charset="0"/>
+              </a:rPr>
+              <a:t>}</a:t>
+            </a:r>
           </a:p>
         </p:txBody>
       </p:sp>
@@ -16696,7 +16738,7 @@
               <a:defRPr/>
             </a:pPr>
             <a:r>
-              <a:rPr kumimoji="1" lang="en-US" altLang="ko-KR" sz="3600" b="0" i="0" u="none" strike="noStrike" kern="1200" cap="none" spc="0" normalizeH="0" baseline="0" noProof="0" dirty="0" err="1">
+              <a:rPr kumimoji="1" lang="en-US" altLang="ko-KR" sz="3600" b="0" i="0" u="none" strike="noStrike" kern="1200" cap="none" spc="0" normalizeH="0" baseline="0" noProof="0" dirty="0">
                 <a:ln w="19050">
                   <a:noFill/>
                 </a:ln>
@@ -16710,22 +16752,42 @@
                 <a:ea typeface="나눔고딕" panose="020D0604000000000000" pitchFamily="50" charset="-127"/>
                 <a:cs typeface="Arial" pitchFamily="34" charset="0"/>
               </a:rPr>
-              <a:t>MK_bible_verse</a:t>
-            </a:r>
-            <a:endParaRPr kumimoji="1" lang="en-US" altLang="ko-KR" sz="3600" b="0" i="0" u="none" strike="noStrike" kern="1200" cap="none" spc="0" normalizeH="0" baseline="0" noProof="0" dirty="0">
-              <a:ln w="19050">
-                <a:noFill/>
-              </a:ln>
-              <a:solidFill>
-                <a:srgbClr val="AF6D1F"/>
-              </a:solidFill>
-              <a:effectLst/>
-              <a:uLnTx/>
-              <a:uFillTx/>
-              <a:latin typeface="나눔고딕" panose="020D0604000000000000" pitchFamily="50" charset="-127"/>
-              <a:ea typeface="나눔고딕" panose="020D0604000000000000" pitchFamily="50" charset="-127"/>
-              <a:cs typeface="Arial" pitchFamily="34" charset="0"/>
-            </a:endParaRPr>
+              <a:t>{</a:t>
+            </a:r>
+            <a:r>
+              <a:rPr kumimoji="1" lang="en-US" altLang="ko-KR" sz="3600" b="0" i="0" u="none" strike="noStrike" kern="1200" cap="none" spc="0" normalizeH="0" baseline="0" noProof="0" dirty="0" err="1">
+                <a:ln w="19050">
+                  <a:noFill/>
+                </a:ln>
+                <a:solidFill>
+                  <a:srgbClr val="AF6D1F"/>
+                </a:solidFill>
+                <a:effectLst/>
+                <a:uLnTx/>
+                <a:uFillTx/>
+                <a:latin typeface="나눔고딕" panose="020D0604000000000000" pitchFamily="50" charset="-127"/>
+                <a:ea typeface="나눔고딕" panose="020D0604000000000000" pitchFamily="50" charset="-127"/>
+                <a:cs typeface="Arial" pitchFamily="34" charset="0"/>
+              </a:rPr>
+              <a:t>bible_verse</a:t>
+            </a:r>
+            <a:r>
+              <a:rPr kumimoji="1" lang="en-US" altLang="ko-KR" sz="3600" b="0" i="0" u="none" strike="noStrike" kern="1200" cap="none" spc="0" normalizeH="0" baseline="0" noProof="0" dirty="0">
+                <a:ln w="19050">
+                  <a:noFill/>
+                </a:ln>
+                <a:solidFill>
+                  <a:srgbClr val="AF6D1F"/>
+                </a:solidFill>
+                <a:effectLst/>
+                <a:uLnTx/>
+                <a:uFillTx/>
+                <a:latin typeface="나눔고딕" panose="020D0604000000000000" pitchFamily="50" charset="-127"/>
+                <a:ea typeface="나눔고딕" panose="020D0604000000000000" pitchFamily="50" charset="-127"/>
+                <a:cs typeface="Arial" pitchFamily="34" charset="0"/>
+              </a:rPr>
+              <a:t>}</a:t>
+            </a:r>
           </a:p>
           <a:p>
             <a:pPr marL="0" marR="0" lvl="0" indent="0" algn="l" defTabSz="914400" rtl="0" eaLnBrk="1" fontAlgn="base" latinLnBrk="1" hangingPunct="1">
@@ -16775,7 +16837,7 @@
               <a:defRPr/>
             </a:pPr>
             <a:r>
-              <a:rPr kumimoji="1" lang="en-US" altLang="ko-KR" sz="2800" b="0" i="0" u="none" strike="noStrike" kern="1200" cap="none" spc="0" normalizeH="0" baseline="0" noProof="0" dirty="0" err="1">
+              <a:rPr kumimoji="1" lang="en-US" altLang="ko-KR" sz="2800" b="0" i="0" u="none" strike="noStrike" kern="1200" cap="none" spc="0" normalizeH="0" baseline="0" noProof="0" dirty="0">
                 <a:ln w="19050">
                   <a:noFill/>
                 </a:ln>
@@ -16789,22 +16851,8 @@
                 <a:ea typeface="나눔고딕" panose="020D0604000000000000" pitchFamily="50" charset="-127"/>
                 <a:cs typeface="Arial" pitchFamily="34" charset="0"/>
               </a:rPr>
-              <a:t>MK_preacher</a:t>
-            </a:r>
-            <a:endParaRPr kumimoji="1" lang="en-US" altLang="ko-KR" sz="2800" b="0" i="0" u="none" strike="noStrike" kern="1200" cap="none" spc="0" normalizeH="0" baseline="0" noProof="0" dirty="0">
-              <a:ln w="19050">
-                <a:noFill/>
-              </a:ln>
-              <a:solidFill>
-                <a:schemeClr val="bg1"/>
-              </a:solidFill>
-              <a:effectLst/>
-              <a:uLnTx/>
-              <a:uFillTx/>
-              <a:latin typeface="나눔고딕" panose="020D0604000000000000" pitchFamily="50" charset="-127"/>
-              <a:ea typeface="나눔고딕" panose="020D0604000000000000" pitchFamily="50" charset="-127"/>
-              <a:cs typeface="Arial" pitchFamily="34" charset="0"/>
-            </a:endParaRPr>
+              <a:t>{preacher}</a:t>
+            </a:r>
           </a:p>
         </p:txBody>
       </p:sp>
@@ -17398,7 +17446,7 @@
               <a:defRPr/>
             </a:pPr>
             <a:r>
-              <a:rPr kumimoji="1" lang="en-US" altLang="ko-KR" sz="3200" b="1" i="0" u="none" strike="noStrike" kern="1200" cap="none" spc="0" normalizeH="0" baseline="0" noProof="0" dirty="0" err="1">
+              <a:rPr kumimoji="1" lang="de-DE" altLang="ko-KR" sz="3200" b="1" i="0" u="none" strike="noStrike" kern="1200" cap="none" spc="0" normalizeH="0" baseline="0" noProof="0" dirty="0">
                 <a:ln>
                   <a:noFill/>
                 </a:ln>
@@ -17412,41 +17460,7 @@
                 <a:ea typeface="나눔고딕" panose="020D0604000000000000" pitchFamily="50" charset="-127"/>
                 <a:cs typeface="Arial" pitchFamily="34" charset="0"/>
               </a:rPr>
-              <a:t>MK_book_short</a:t>
-            </a:r>
-            <a:r>
-              <a:rPr kumimoji="1" lang="en-US" altLang="ko-KR" sz="3200" b="1" i="0" u="none" strike="noStrike" kern="1200" cap="none" spc="0" normalizeH="0" baseline="0" noProof="0" dirty="0">
-                <a:ln>
-                  <a:noFill/>
-                </a:ln>
-                <a:solidFill>
-                  <a:srgbClr val="F0F0F0"/>
-                </a:solidFill>
-                <a:effectLst/>
-                <a:uLnTx/>
-                <a:uFillTx/>
-                <a:latin typeface="나눔고딕" panose="020D0604000000000000" pitchFamily="50" charset="-127"/>
-                <a:ea typeface="나눔고딕" panose="020D0604000000000000" pitchFamily="50" charset="-127"/>
-                <a:cs typeface="Arial" pitchFamily="34" charset="0"/>
-              </a:rPr>
-              <a:t> </a:t>
-            </a:r>
-            <a:r>
-              <a:rPr kumimoji="1" lang="en-US" altLang="ko-KR" sz="3200" b="1" i="0" u="none" strike="noStrike" kern="1200" cap="none" spc="0" normalizeH="0" baseline="0" noProof="0" dirty="0" err="1">
-                <a:ln>
-                  <a:noFill/>
-                </a:ln>
-                <a:solidFill>
-                  <a:srgbClr val="F0F0F0"/>
-                </a:solidFill>
-                <a:effectLst/>
-                <a:uLnTx/>
-                <a:uFillTx/>
-                <a:latin typeface="나눔고딕" panose="020D0604000000000000" pitchFamily="50" charset="-127"/>
-                <a:ea typeface="나눔고딕" panose="020D0604000000000000" pitchFamily="50" charset="-127"/>
-                <a:cs typeface="Arial" pitchFamily="34" charset="0"/>
-              </a:rPr>
-              <a:t>MK_chapter:MK_verse_no</a:t>
+              <a:t>{each_verse:%b %c:%v}</a:t>
             </a:r>
             <a:endParaRPr kumimoji="1" lang="en-US" altLang="ko-KR" sz="3200" b="1" i="0" u="none" strike="noStrike" kern="1200" cap="none" spc="0" normalizeH="0" baseline="0" noProof="0" dirty="0">
               <a:ln>
@@ -17542,7 +17556,7 @@
               <a:defRPr/>
             </a:pPr>
             <a:r>
-              <a:rPr kumimoji="1" lang="en-US" altLang="ko-KR" sz="3200" b="1" i="0" u="none" strike="noStrike" kern="1200" cap="none" spc="0" normalizeH="0" baseline="0" noProof="0" dirty="0" err="1">
+              <a:rPr kumimoji="1" lang="en-US" altLang="ko-KR" sz="3200" b="1" i="0" u="none" strike="noStrike" kern="1200" cap="none" spc="0" normalizeH="0" baseline="0" noProof="0" dirty="0">
                 <a:ln>
                   <a:noFill/>
                 </a:ln>
@@ -17556,22 +17570,42 @@
                 <a:ea typeface="나눔고딕 ExtraBold" panose="020D0904000000000000" pitchFamily="50" charset="-127"/>
                 <a:cs typeface="Arial" pitchFamily="34" charset="0"/>
               </a:rPr>
-              <a:t>MK_verse_text</a:t>
-            </a:r>
-            <a:endParaRPr kumimoji="1" lang="en-US" altLang="ko-KR" sz="3200" b="1" i="0" u="none" strike="noStrike" kern="1200" cap="none" spc="0" normalizeH="0" baseline="0" noProof="0" dirty="0">
-              <a:ln>
-                <a:noFill/>
-              </a:ln>
-              <a:solidFill>
-                <a:srgbClr val="F0F0F0"/>
-              </a:solidFill>
-              <a:effectLst/>
-              <a:uLnTx/>
-              <a:uFillTx/>
-              <a:latin typeface="나눔고딕 ExtraBold" panose="020D0904000000000000" pitchFamily="50" charset="-127"/>
-              <a:ea typeface="나눔고딕 ExtraBold" panose="020D0904000000000000" pitchFamily="50" charset="-127"/>
-              <a:cs typeface="Arial" pitchFamily="34" charset="0"/>
-            </a:endParaRPr>
+              <a:t>{</a:t>
+            </a:r>
+            <a:r>
+              <a:rPr kumimoji="1" lang="en-US" altLang="ko-KR" sz="3200" b="1" i="0" u="none" strike="noStrike" kern="1200" cap="none" spc="0" normalizeH="0" baseline="0" noProof="0" dirty="0" err="1">
+                <a:ln>
+                  <a:noFill/>
+                </a:ln>
+                <a:solidFill>
+                  <a:srgbClr val="F0F0F0"/>
+                </a:solidFill>
+                <a:effectLst/>
+                <a:uLnTx/>
+                <a:uFillTx/>
+                <a:latin typeface="나눔고딕 ExtraBold" panose="020D0904000000000000" pitchFamily="50" charset="-127"/>
+                <a:ea typeface="나눔고딕 ExtraBold" panose="020D0904000000000000" pitchFamily="50" charset="-127"/>
+                <a:cs typeface="Arial" pitchFamily="34" charset="0"/>
+              </a:rPr>
+              <a:t>each_verse</a:t>
+            </a:r>
+            <a:r>
+              <a:rPr kumimoji="1" lang="en-US" altLang="ko-KR" sz="3200" b="1" i="0" u="none" strike="noStrike" kern="1200" cap="none" spc="0" normalizeH="0" baseline="0" noProof="0" dirty="0">
+                <a:ln>
+                  <a:noFill/>
+                </a:ln>
+                <a:solidFill>
+                  <a:srgbClr val="F0F0F0"/>
+                </a:solidFill>
+                <a:effectLst/>
+                <a:uLnTx/>
+                <a:uFillTx/>
+                <a:latin typeface="나눔고딕 ExtraBold" panose="020D0904000000000000" pitchFamily="50" charset="-127"/>
+                <a:ea typeface="나눔고딕 ExtraBold" panose="020D0904000000000000" pitchFamily="50" charset="-127"/>
+                <a:cs typeface="Arial" pitchFamily="34" charset="0"/>
+              </a:rPr>
+              <a:t>:%t}</a:t>
+            </a:r>
           </a:p>
         </p:txBody>
       </p:sp>
@@ -17895,7 +17929,7 @@
               <a:defRPr/>
             </a:pPr>
             <a:r>
-              <a:rPr kumimoji="1" lang="en-US" altLang="ko-KR" sz="3200" b="1" i="0" u="none" strike="noStrike" kern="1200" cap="none" spc="-150" normalizeH="0" baseline="0" noProof="0" dirty="0" err="1">
+              <a:rPr kumimoji="1" lang="en-US" altLang="ko-KR" sz="3200" b="1" i="0" u="none" strike="noStrike" kern="1200" cap="none" spc="-150" normalizeH="0" baseline="0" noProof="0" dirty="0">
                 <a:ln>
                   <a:noFill/>
                 </a:ln>
@@ -17915,7 +17949,53 @@
                 <a:ea typeface="나눔고딕 ExtraBold" panose="020D0904000000000000" pitchFamily="50" charset="-127"/>
                 <a:cs typeface="+mj-cs"/>
               </a:rPr>
-              <a:t>MK_sermon_title</a:t>
+              <a:t>{</a:t>
+            </a:r>
+            <a:r>
+              <a:rPr kumimoji="1" lang="en-US" altLang="ko-KR" sz="3200" b="1" i="0" u="none" strike="noStrike" kern="1200" cap="none" spc="-150" normalizeH="0" baseline="0" noProof="0" dirty="0" err="1">
+                <a:ln>
+                  <a:noFill/>
+                </a:ln>
+                <a:solidFill>
+                  <a:srgbClr val="0070C0"/>
+                </a:solidFill>
+                <a:effectLst>
+                  <a:outerShdw blurRad="50800" dist="38100" dir="2700000" algn="tl" rotWithShape="0">
+                    <a:prstClr val="black">
+                      <a:alpha val="40000"/>
+                    </a:prstClr>
+                  </a:outerShdw>
+                </a:effectLst>
+                <a:uLnTx/>
+                <a:uFillTx/>
+                <a:latin typeface="나눔고딕 ExtraBold" panose="020D0904000000000000" pitchFamily="50" charset="-127"/>
+                <a:ea typeface="나눔고딕 ExtraBold" panose="020D0904000000000000" pitchFamily="50" charset="-127"/>
+                <a:cs typeface="+mj-cs"/>
+              </a:rPr>
+              <a:t>sermon_title</a:t>
+            </a:r>
+            <a:r>
+              <a:rPr kumimoji="1" lang="en-US" altLang="ko-KR" sz="3200" b="1" i="0" u="none" strike="noStrike" kern="1200" cap="none" spc="-150" normalizeH="0" baseline="0" noProof="0" dirty="0">
+                <a:ln>
+                  <a:noFill/>
+                </a:ln>
+                <a:solidFill>
+                  <a:srgbClr val="0070C0"/>
+                </a:solidFill>
+                <a:effectLst>
+                  <a:outerShdw blurRad="50800" dist="38100" dir="2700000" algn="tl" rotWithShape="0">
+                    <a:prstClr val="black">
+                      <a:alpha val="40000"/>
+                    </a:prstClr>
+                  </a:outerShdw>
+                </a:effectLst>
+                <a:uLnTx/>
+                <a:uFillTx/>
+                <a:latin typeface="나눔고딕 ExtraBold" panose="020D0904000000000000" pitchFamily="50" charset="-127"/>
+                <a:ea typeface="나눔고딕 ExtraBold" panose="020D0904000000000000" pitchFamily="50" charset="-127"/>
+                <a:cs typeface="+mj-cs"/>
+              </a:rPr>
+              <a:t>}</a:t>
             </a:r>
             <a:endParaRPr kumimoji="1" lang="ko-KR" altLang="en-US" sz="3200" b="1" i="0" u="none" strike="noStrike" kern="1200" cap="none" spc="-150" normalizeH="0" baseline="0" noProof="0" dirty="0">
               <a:ln>
@@ -18151,7 +18231,7 @@
               <a:defRPr/>
             </a:pPr>
             <a:r>
-              <a:rPr kumimoji="1" lang="en-US" altLang="ko-KR" sz="2400" b="1" i="0" u="none" strike="noStrike" kern="1200" cap="none" spc="-150" normalizeH="0" baseline="0" noProof="0" dirty="0" err="1">
+              <a:rPr kumimoji="1" lang="en-US" altLang="ko-KR" sz="2400" b="1" i="0" u="none" strike="noStrike" kern="1200" cap="none" spc="-150" normalizeH="0" baseline="0" noProof="0" dirty="0">
                 <a:ln>
                   <a:noFill/>
                 </a:ln>
@@ -18170,27 +18250,8 @@
                 <a:latin typeface="나눔고딕 ExtraBold" panose="020D0904000000000000" pitchFamily="50" charset="-127"/>
                 <a:ea typeface="나눔고딕 ExtraBold" panose="020D0904000000000000" pitchFamily="50" charset="-127"/>
               </a:rPr>
-              <a:t>MK_preacher</a:t>
-            </a:r>
-            <a:endParaRPr kumimoji="1" lang="en-US" altLang="ko-KR" sz="2400" b="1" i="0" u="none" strike="noStrike" kern="1200" cap="none" spc="-150" normalizeH="0" baseline="0" noProof="0" dirty="0">
-              <a:ln>
-                <a:noFill/>
-              </a:ln>
-              <a:solidFill>
-                <a:srgbClr val="F0F0F0"/>
-              </a:solidFill>
-              <a:effectLst>
-                <a:outerShdw blurRad="50800" dist="38100" dir="2700000" algn="tl" rotWithShape="0">
-                  <a:prstClr val="black">
-                    <a:alpha val="40000"/>
-                  </a:prstClr>
-                </a:outerShdw>
-              </a:effectLst>
-              <a:uLnTx/>
-              <a:uFillTx/>
-              <a:latin typeface="나눔고딕 ExtraBold" panose="020D0904000000000000" pitchFamily="50" charset="-127"/>
-              <a:ea typeface="나눔고딕 ExtraBold" panose="020D0904000000000000" pitchFamily="50" charset="-127"/>
-            </a:endParaRPr>
+              <a:t>{preacher}</a:t>
+            </a:r>
           </a:p>
         </p:txBody>
       </p:sp>
@@ -18783,7 +18844,7 @@
               <a:defRPr/>
             </a:pPr>
             <a:r>
-              <a:rPr kumimoji="1" lang="en-US" altLang="ko-KR" sz="3200" b="1" i="0" u="none" strike="noStrike" kern="1200" cap="none" spc="0" normalizeH="0" baseline="0" noProof="0" dirty="0" err="1">
+              <a:rPr kumimoji="1" lang="en-US" altLang="ko-KR" sz="3200" b="1" i="0" u="none" strike="noStrike" kern="1200" cap="none" spc="0" normalizeH="0" baseline="0" noProof="0" dirty="0">
                 <a:ln>
                   <a:noFill/>
                 </a:ln>
@@ -18797,22 +18858,42 @@
                 <a:ea typeface="나눔고딕" panose="020D0604000000000000" pitchFamily="50" charset="-127"/>
                 <a:cs typeface="Arial" pitchFamily="34" charset="0"/>
               </a:rPr>
-              <a:t>MK_sermon_title</a:t>
-            </a:r>
-            <a:endParaRPr kumimoji="1" lang="en-US" altLang="ko-KR" sz="3200" b="1" i="0" u="none" strike="noStrike" kern="1200" cap="none" spc="0" normalizeH="0" baseline="0" noProof="0" dirty="0">
-              <a:ln>
-                <a:noFill/>
-              </a:ln>
-              <a:solidFill>
-                <a:srgbClr val="F0F0F0"/>
-              </a:solidFill>
-              <a:effectLst/>
-              <a:uLnTx/>
-              <a:uFillTx/>
-              <a:latin typeface="나눔고딕" panose="020D0604000000000000" pitchFamily="50" charset="-127"/>
-              <a:ea typeface="나눔고딕" panose="020D0604000000000000" pitchFamily="50" charset="-127"/>
-              <a:cs typeface="Arial" pitchFamily="34" charset="0"/>
-            </a:endParaRPr>
+              <a:t>{</a:t>
+            </a:r>
+            <a:r>
+              <a:rPr kumimoji="1" lang="en-US" altLang="ko-KR" sz="3200" b="1" i="0" u="none" strike="noStrike" kern="1200" cap="none" spc="0" normalizeH="0" baseline="0" noProof="0" dirty="0" err="1">
+                <a:ln>
+                  <a:noFill/>
+                </a:ln>
+                <a:solidFill>
+                  <a:srgbClr val="F0F0F0"/>
+                </a:solidFill>
+                <a:effectLst/>
+                <a:uLnTx/>
+                <a:uFillTx/>
+                <a:latin typeface="나눔고딕" panose="020D0604000000000000" pitchFamily="50" charset="-127"/>
+                <a:ea typeface="나눔고딕" panose="020D0604000000000000" pitchFamily="50" charset="-127"/>
+                <a:cs typeface="Arial" pitchFamily="34" charset="0"/>
+              </a:rPr>
+              <a:t>sermon_title</a:t>
+            </a:r>
+            <a:r>
+              <a:rPr kumimoji="1" lang="en-US" altLang="ko-KR" sz="3200" b="1" i="0" u="none" strike="noStrike" kern="1200" cap="none" spc="0" normalizeH="0" baseline="0" noProof="0" dirty="0">
+                <a:ln>
+                  <a:noFill/>
+                </a:ln>
+                <a:solidFill>
+                  <a:srgbClr val="F0F0F0"/>
+                </a:solidFill>
+                <a:effectLst/>
+                <a:uLnTx/>
+                <a:uFillTx/>
+                <a:latin typeface="나눔고딕" panose="020D0604000000000000" pitchFamily="50" charset="-127"/>
+                <a:ea typeface="나눔고딕" panose="020D0604000000000000" pitchFamily="50" charset="-127"/>
+                <a:cs typeface="Arial" pitchFamily="34" charset="0"/>
+              </a:rPr>
+              <a:t>}</a:t>
+            </a:r>
           </a:p>
         </p:txBody>
       </p:sp>
@@ -18893,7 +18974,7 @@
               <a:defRPr/>
             </a:pPr>
             <a:r>
-              <a:rPr kumimoji="1" lang="en-US" altLang="ko-KR" sz="3200" b="1" i="0" u="none" strike="noStrike" kern="1200" cap="none" spc="0" normalizeH="0" baseline="0" noProof="0" dirty="0" err="1">
+              <a:rPr kumimoji="1" lang="en-US" altLang="ko-KR" sz="3200" b="1" i="0" u="none" strike="noStrike" kern="1200" cap="none" spc="0" normalizeH="0" baseline="0" noProof="0" dirty="0">
                 <a:ln>
                   <a:noFill/>
                 </a:ln>
@@ -18907,22 +18988,42 @@
                 <a:ea typeface="나눔고딕 ExtraBold" panose="020D0904000000000000" pitchFamily="50" charset="-127"/>
                 <a:cs typeface="Arial" pitchFamily="34" charset="0"/>
               </a:rPr>
-              <a:t>MK_sermon_text</a:t>
-            </a:r>
-            <a:endParaRPr kumimoji="1" lang="en-US" altLang="ko-KR" sz="3200" b="1" i="0" u="none" strike="noStrike" kern="1200" cap="none" spc="0" normalizeH="0" baseline="0" noProof="0" dirty="0">
-              <a:ln>
-                <a:noFill/>
-              </a:ln>
-              <a:solidFill>
-                <a:srgbClr val="F0F0F0"/>
-              </a:solidFill>
-              <a:effectLst/>
-              <a:uLnTx/>
-              <a:uFillTx/>
-              <a:latin typeface="나눔고딕 ExtraBold" panose="020D0904000000000000" pitchFamily="50" charset="-127"/>
-              <a:ea typeface="나눔고딕 ExtraBold" panose="020D0904000000000000" pitchFamily="50" charset="-127"/>
-              <a:cs typeface="Arial" pitchFamily="34" charset="0"/>
-            </a:endParaRPr>
+              <a:t>{</a:t>
+            </a:r>
+            <a:r>
+              <a:rPr kumimoji="1" lang="en-US" altLang="ko-KR" sz="3200" b="1" i="0" u="none" strike="noStrike" kern="1200" cap="none" spc="0" normalizeH="0" baseline="0" noProof="0" dirty="0" err="1">
+                <a:ln>
+                  <a:noFill/>
+                </a:ln>
+                <a:solidFill>
+                  <a:srgbClr val="F0F0F0"/>
+                </a:solidFill>
+                <a:effectLst/>
+                <a:uLnTx/>
+                <a:uFillTx/>
+                <a:latin typeface="나눔고딕 ExtraBold" panose="020D0904000000000000" pitchFamily="50" charset="-127"/>
+                <a:ea typeface="나눔고딕 ExtraBold" panose="020D0904000000000000" pitchFamily="50" charset="-127"/>
+                <a:cs typeface="Arial" pitchFamily="34" charset="0"/>
+              </a:rPr>
+              <a:t>sermon_text</a:t>
+            </a:r>
+            <a:r>
+              <a:rPr kumimoji="1" lang="en-US" altLang="ko-KR" sz="3200" b="1" i="0" u="none" strike="noStrike" kern="1200" cap="none" spc="0" normalizeH="0" baseline="0" noProof="0" dirty="0">
+                <a:ln>
+                  <a:noFill/>
+                </a:ln>
+                <a:solidFill>
+                  <a:srgbClr val="F0F0F0"/>
+                </a:solidFill>
+                <a:effectLst/>
+                <a:uLnTx/>
+                <a:uFillTx/>
+                <a:latin typeface="나눔고딕 ExtraBold" panose="020D0904000000000000" pitchFamily="50" charset="-127"/>
+                <a:ea typeface="나눔고딕 ExtraBold" panose="020D0904000000000000" pitchFamily="50" charset="-127"/>
+                <a:cs typeface="Arial" pitchFamily="34" charset="0"/>
+              </a:rPr>
+              <a:t>}</a:t>
+            </a:r>
           </a:p>
         </p:txBody>
       </p:sp>
@@ -19024,7 +19125,7 @@
                 <a:latin typeface="나눔고딕 ExtraBold" panose="020D0904000000000000" pitchFamily="50" charset="-127"/>
                 <a:ea typeface="나눔고딕 ExtraBold" panose="020D0904000000000000" pitchFamily="50" charset="-127"/>
               </a:rPr>
-              <a:t>“</a:t>
+              <a:t>“{</a:t>
             </a:r>
             <a:r>
               <a:rPr kumimoji="1" lang="en-US" altLang="ko-KR" sz="4800" b="1" i="0" u="none" strike="noStrike" kern="1200" cap="none" spc="0" normalizeH="0" baseline="0" noProof="0" dirty="0" err="1">
@@ -19046,7 +19147,7 @@
                 <a:latin typeface="나눔고딕 ExtraBold" panose="020D0904000000000000" pitchFamily="50" charset="-127"/>
                 <a:ea typeface="나눔고딕 ExtraBold" panose="020D0904000000000000" pitchFamily="50" charset="-127"/>
               </a:rPr>
-              <a:t>MK_sermon_title</a:t>
+              <a:t>sermon_title</a:t>
             </a:r>
             <a:r>
               <a:rPr kumimoji="1" lang="en-US" altLang="ko-KR" sz="4800" b="1" i="0" u="none" strike="noStrike" kern="1200" cap="none" spc="0" normalizeH="0" baseline="0" noProof="0" dirty="0">
@@ -19068,7 +19169,7 @@
                 <a:latin typeface="나눔고딕 ExtraBold" panose="020D0904000000000000" pitchFamily="50" charset="-127"/>
                 <a:ea typeface="나눔고딕 ExtraBold" panose="020D0904000000000000" pitchFamily="50" charset="-127"/>
               </a:rPr>
-              <a:t>”</a:t>
+              <a:t>}”</a:t>
             </a:r>
           </a:p>
           <a:p>
@@ -19122,7 +19223,7 @@
               <a:defRPr/>
             </a:pPr>
             <a:r>
-              <a:rPr kumimoji="0" lang="en-US" altLang="ko-KR" sz="4600" b="0" i="0" u="none" strike="noStrike" kern="1200" cap="none" spc="0" normalizeH="0" baseline="0" noProof="0" dirty="0" err="1">
+              <a:rPr kumimoji="0" lang="en-US" altLang="ko-KR" sz="4600" b="0" i="0" u="none" strike="noStrike" kern="1200" cap="none" spc="0" normalizeH="0" baseline="0" noProof="0" dirty="0">
                 <a:ln>
                   <a:solidFill>
                     <a:srgbClr val="000000"/>
@@ -19137,7 +19238,7 @@
                 <a:latin typeface="나눔고딕 ExtraBold" panose="020D0904000000000000" pitchFamily="50" charset="-127"/>
                 <a:ea typeface="나눔고딕 ExtraBold" panose="020D0904000000000000" pitchFamily="50" charset="-127"/>
               </a:rPr>
-              <a:t>MK_preacher</a:t>
+              <a:t>{preacher}</a:t>
             </a:r>
             <a:endParaRPr kumimoji="0" lang="en-US" sz="4600" b="0" i="0" u="none" strike="noStrike" kern="1200" cap="none" spc="0" normalizeH="0" baseline="0" noProof="0" dirty="0">
               <a:ln>
@@ -19580,7 +19681,7 @@
               <a:t>&lt;</a:t>
             </a:r>
             <a:r>
-              <a:rPr kumimoji="1" lang="en-US" altLang="ko-KR" sz="4000" b="1" i="0" u="none" strike="noStrike" kern="1200" cap="none" spc="0" normalizeH="0" baseline="0" noProof="0" dirty="0" err="1">
+              <a:rPr kumimoji="1" lang="en-US" altLang="ko-KR" sz="4000" b="1" i="0" u="none" strike="noStrike" kern="1200" cap="none" spc="0" normalizeH="0" baseline="0" noProof="0" dirty="0">
                 <a:ln>
                   <a:solidFill>
                     <a:srgbClr val="000000"/>
@@ -19598,10 +19699,10 @@
                 <a:ea typeface="나눔고딕 ExtraBold" panose="020D0904000000000000" pitchFamily="50" charset="-127"/>
                 <a:cs typeface="Arial"/>
               </a:rPr>
-              <a:t>MK_bible_verse</a:t>
-            </a:r>
-            <a:r>
-              <a:rPr kumimoji="1" lang="en-US" altLang="ko-KR" sz="4000" b="1" i="0" u="none" strike="noStrike" kern="1200" cap="none" spc="0" normalizeH="0" baseline="0" noProof="0" dirty="0">
+              <a:t>{</a:t>
+            </a:r>
+            <a:r>
+              <a:rPr kumimoji="1" lang="en-US" altLang="ko-KR" sz="4000" b="1" i="0" u="none" strike="noStrike" kern="1200" cap="none" spc="0" normalizeH="0" baseline="0" noProof="0" dirty="0" err="1">
                 <a:ln>
                   <a:solidFill>
                     <a:srgbClr val="000000"/>
@@ -19619,7 +19720,28 @@
                 <a:ea typeface="나눔고딕 ExtraBold" panose="020D0904000000000000" pitchFamily="50" charset="-127"/>
                 <a:cs typeface="Arial"/>
               </a:rPr>
-              <a:t>&gt;</a:t>
+              <a:t>bible_verse</a:t>
+            </a:r>
+            <a:r>
+              <a:rPr kumimoji="1" lang="en-US" altLang="ko-KR" sz="4000" b="1" i="0" u="none" strike="noStrike" kern="1200" cap="none" spc="0" normalizeH="0" baseline="0" noProof="0" dirty="0">
+                <a:ln>
+                  <a:solidFill>
+                    <a:srgbClr val="000000"/>
+                  </a:solidFill>
+                </a:ln>
+                <a:solidFill>
+                  <a:srgbClr val="00E7E7">
+                    <a:lumMod val="50000"/>
+                  </a:srgbClr>
+                </a:solidFill>
+                <a:effectLst/>
+                <a:uLnTx/>
+                <a:uFillTx/>
+                <a:latin typeface="나눔고딕 ExtraBold" panose="020D0904000000000000" pitchFamily="50" charset="-127"/>
+                <a:ea typeface="나눔고딕 ExtraBold" panose="020D0904000000000000" pitchFamily="50" charset="-127"/>
+                <a:cs typeface="Arial"/>
+              </a:rPr>
+              <a:t>}&gt;</a:t>
             </a:r>
           </a:p>
         </p:txBody>
@@ -19851,7 +19973,7 @@
               <a:defRPr/>
             </a:pPr>
             <a:r>
-              <a:rPr kumimoji="1" lang="en-US" altLang="ko-KR" sz="4000" b="1" i="0" u="none" strike="noStrike" kern="0" cap="none" spc="0" normalizeH="0" baseline="0" noProof="0" dirty="0" err="1">
+              <a:rPr kumimoji="1" lang="de-DE" altLang="ko-KR" sz="4000" b="1" i="0" u="none" strike="noStrike" kern="0" cap="none" spc="0" normalizeH="0" baseline="0" noProof="0" dirty="0">
                 <a:ln>
                   <a:noFill/>
                 </a:ln>
@@ -19871,7 +19993,7 @@
                 <a:ea typeface="나눔고딕 ExtraBold" panose="020D0904000000000000" pitchFamily="50" charset="-127"/>
                 <a:cs typeface="+mj-cs"/>
               </a:rPr>
-              <a:t>MK_verse_no</a:t>
+              <a:t>{each_verse:%b %c:%v}</a:t>
             </a:r>
             <a:r>
               <a:rPr kumimoji="1" lang="en-US" altLang="ko-KR" sz="4000" b="1" i="0" u="none" strike="noStrike" kern="0" cap="none" spc="0" normalizeH="0" baseline="0" noProof="0" dirty="0">
@@ -19923,7 +20045,7 @@
               <a:t> </a:t>
             </a:r>
             <a:r>
-              <a:rPr kumimoji="1" lang="en-US" altLang="ko-KR" sz="4000" b="1" i="0" u="none" strike="noStrike" kern="0" cap="none" spc="0" normalizeH="0" baseline="0" noProof="0" dirty="0" err="1">
+              <a:rPr kumimoji="1" lang="en-US" altLang="ko-KR" sz="4000" b="1" i="0" u="none" strike="noStrike" kern="0" cap="none" spc="0" normalizeH="0" baseline="0" noProof="0" dirty="0">
                 <a:ln>
                   <a:noFill/>
                 </a:ln>
@@ -19946,7 +20068,59 @@
                 <a:ea typeface="나눔고딕 ExtraBold" panose="020D0904000000000000" pitchFamily="50" charset="-127"/>
                 <a:cs typeface="+mj-cs"/>
               </a:rPr>
-              <a:t>MK_verse_text</a:t>
+              <a:t>{</a:t>
+            </a:r>
+            <a:r>
+              <a:rPr kumimoji="1" lang="en-US" altLang="ko-KR" sz="4000" b="1" i="0" u="none" strike="noStrike" kern="0" cap="none" spc="0" normalizeH="0" baseline="0" noProof="0" dirty="0" err="1">
+                <a:ln>
+                  <a:noFill/>
+                </a:ln>
+                <a:solidFill>
+                  <a:prstClr val="black">
+                    <a:lumMod val="65000"/>
+                    <a:lumOff val="35000"/>
+                  </a:prstClr>
+                </a:solidFill>
+                <a:effectLst>
+                  <a:outerShdw blurRad="50800" dist="38100" dir="2700000" algn="tl" rotWithShape="0">
+                    <a:prstClr val="black">
+                      <a:alpha val="40000"/>
+                    </a:prstClr>
+                  </a:outerShdw>
+                </a:effectLst>
+                <a:uLnTx/>
+                <a:uFillTx/>
+                <a:latin typeface="나눔고딕 ExtraBold" panose="020D0904000000000000" pitchFamily="50" charset="-127"/>
+                <a:ea typeface="나눔고딕 ExtraBold" panose="020D0904000000000000" pitchFamily="50" charset="-127"/>
+                <a:cs typeface="+mj-cs"/>
+              </a:rPr>
+              <a:t>each_verse</a:t>
+            </a:r>
+            <a:r>
+              <a:rPr kumimoji="1" lang="en-US" altLang="ko-KR" sz="4000" b="1" i="0" u="none" strike="noStrike" kern="0" cap="none" spc="0" normalizeH="0" baseline="0" noProof="0" dirty="0">
+                <a:ln>
+                  <a:noFill/>
+                </a:ln>
+                <a:solidFill>
+                  <a:prstClr val="black">
+                    <a:lumMod val="65000"/>
+                    <a:lumOff val="35000"/>
+                  </a:prstClr>
+                </a:solidFill>
+                <a:effectLst>
+                  <a:outerShdw blurRad="50800" dist="38100" dir="2700000" algn="tl" rotWithShape="0">
+                    <a:prstClr val="black">
+                      <a:alpha val="40000"/>
+                    </a:prstClr>
+                  </a:outerShdw>
+                </a:effectLst>
+                <a:uLnTx/>
+                <a:uFillTx/>
+                <a:latin typeface="나눔고딕 ExtraBold" panose="020D0904000000000000" pitchFamily="50" charset="-127"/>
+                <a:ea typeface="나눔고딕 ExtraBold" panose="020D0904000000000000" pitchFamily="50" charset="-127"/>
+                <a:cs typeface="+mj-cs"/>
+              </a:rPr>
+              <a:t>:%t}</a:t>
             </a:r>
             <a:endParaRPr kumimoji="1" lang="ko-KR" altLang="en-US" sz="4000" b="1" i="0" u="none" strike="noStrike" kern="0" cap="none" spc="0" normalizeH="0" baseline="0" noProof="0" dirty="0">
               <a:ln>
@@ -20072,7 +20246,7 @@
                 <a:latin typeface="나눔고딕 ExtraBold" panose="020D0904000000000000" pitchFamily="50" charset="-127"/>
                 <a:ea typeface="나눔고딕 ExtraBold" panose="020D0904000000000000" pitchFamily="50" charset="-127"/>
               </a:rPr>
-              <a:t>“</a:t>
+              <a:t>“{</a:t>
             </a:r>
             <a:r>
               <a:rPr kumimoji="1" lang="en-US" altLang="ko-KR" sz="4800" b="1" i="0" u="none" strike="noStrike" kern="1200" cap="none" spc="0" normalizeH="0" baseline="0" noProof="0" dirty="0" err="1">
@@ -20094,7 +20268,7 @@
                 <a:latin typeface="나눔고딕 ExtraBold" panose="020D0904000000000000" pitchFamily="50" charset="-127"/>
                 <a:ea typeface="나눔고딕 ExtraBold" panose="020D0904000000000000" pitchFamily="50" charset="-127"/>
               </a:rPr>
-              <a:t>MK_sermon_title</a:t>
+              <a:t>sermon_title</a:t>
             </a:r>
             <a:r>
               <a:rPr kumimoji="1" lang="en-US" altLang="ko-KR" sz="4800" b="1" i="0" u="none" strike="noStrike" kern="1200" cap="none" spc="0" normalizeH="0" baseline="0" noProof="0" dirty="0">
@@ -20116,7 +20290,7 @@
                 <a:latin typeface="나눔고딕 ExtraBold" panose="020D0904000000000000" pitchFamily="50" charset="-127"/>
                 <a:ea typeface="나눔고딕 ExtraBold" panose="020D0904000000000000" pitchFamily="50" charset="-127"/>
               </a:rPr>
-              <a:t>”</a:t>
+              <a:t>}”</a:t>
             </a:r>
           </a:p>
           <a:p>
@@ -20170,7 +20344,7 @@
               <a:defRPr/>
             </a:pPr>
             <a:r>
-              <a:rPr kumimoji="0" lang="en-US" altLang="ko-KR" sz="4600" b="0" i="0" u="none" strike="noStrike" kern="1200" cap="none" spc="0" normalizeH="0" baseline="0" noProof="0" dirty="0" err="1">
+              <a:rPr kumimoji="0" lang="en-US" altLang="ko-KR" sz="4600" b="0" i="0" u="none" strike="noStrike" kern="1200" cap="none" spc="0" normalizeH="0" baseline="0" noProof="0" dirty="0">
                 <a:ln>
                   <a:solidFill>
                     <a:srgbClr val="000000"/>
@@ -20185,7 +20359,7 @@
                 <a:latin typeface="나눔고딕 ExtraBold" panose="020D0904000000000000" pitchFamily="50" charset="-127"/>
                 <a:ea typeface="나눔고딕 ExtraBold" panose="020D0904000000000000" pitchFamily="50" charset="-127"/>
               </a:rPr>
-              <a:t>MK_preacher</a:t>
+              <a:t>{preacher}</a:t>
             </a:r>
             <a:endParaRPr kumimoji="0" lang="en-US" sz="4600" b="0" i="0" u="none" strike="noStrike" kern="1200" cap="none" spc="0" normalizeH="0" baseline="0" noProof="0" dirty="0">
               <a:ln>
@@ -20433,7 +20607,7 @@
               <a:defRPr/>
             </a:pPr>
             <a:r>
-              <a:rPr kumimoji="1" lang="en-US" altLang="ko-KR" sz="4000" b="1" i="0" u="none" strike="noStrike" kern="0" cap="none" spc="0" normalizeH="0" baseline="0" noProof="0" dirty="0" err="1">
+              <a:rPr kumimoji="1" lang="en-US" altLang="ko-KR" sz="4000" b="1" i="0" u="none" strike="noStrike" kern="0" cap="none" spc="0" normalizeH="0" baseline="0" noProof="0" dirty="0">
                 <a:ln>
                   <a:noFill/>
                 </a:ln>
@@ -20456,7 +20630,59 @@
                 <a:ea typeface="나눔고딕 ExtraBold" panose="020D0904000000000000" pitchFamily="50" charset="-127"/>
                 <a:cs typeface="+mj-cs"/>
               </a:rPr>
-              <a:t>MK_sermon_text</a:t>
+              <a:t>{</a:t>
+            </a:r>
+            <a:r>
+              <a:rPr kumimoji="1" lang="en-US" altLang="ko-KR" sz="4000" b="1" i="0" u="none" strike="noStrike" kern="0" cap="none" spc="0" normalizeH="0" baseline="0" noProof="0" dirty="0" err="1">
+                <a:ln>
+                  <a:noFill/>
+                </a:ln>
+                <a:solidFill>
+                  <a:prstClr val="black">
+                    <a:lumMod val="65000"/>
+                    <a:lumOff val="35000"/>
+                  </a:prstClr>
+                </a:solidFill>
+                <a:effectLst>
+                  <a:outerShdw blurRad="50800" dist="38100" dir="2700000" algn="tl" rotWithShape="0">
+                    <a:prstClr val="black">
+                      <a:alpha val="40000"/>
+                    </a:prstClr>
+                  </a:outerShdw>
+                </a:effectLst>
+                <a:uLnTx/>
+                <a:uFillTx/>
+                <a:latin typeface="나눔고딕 ExtraBold" panose="020D0904000000000000" pitchFamily="50" charset="-127"/>
+                <a:ea typeface="나눔고딕 ExtraBold" panose="020D0904000000000000" pitchFamily="50" charset="-127"/>
+                <a:cs typeface="+mj-cs"/>
+              </a:rPr>
+              <a:t>sermon_text</a:t>
+            </a:r>
+            <a:r>
+              <a:rPr kumimoji="1" lang="en-US" altLang="ko-KR" sz="4000" b="1" i="0" u="none" strike="noStrike" kern="0" cap="none" spc="0" normalizeH="0" baseline="0" noProof="0" dirty="0">
+                <a:ln>
+                  <a:noFill/>
+                </a:ln>
+                <a:solidFill>
+                  <a:prstClr val="black">
+                    <a:lumMod val="65000"/>
+                    <a:lumOff val="35000"/>
+                  </a:prstClr>
+                </a:solidFill>
+                <a:effectLst>
+                  <a:outerShdw blurRad="50800" dist="38100" dir="2700000" algn="tl" rotWithShape="0">
+                    <a:prstClr val="black">
+                      <a:alpha val="40000"/>
+                    </a:prstClr>
+                  </a:outerShdw>
+                </a:effectLst>
+                <a:uLnTx/>
+                <a:uFillTx/>
+                <a:latin typeface="나눔고딕 ExtraBold" panose="020D0904000000000000" pitchFamily="50" charset="-127"/>
+                <a:ea typeface="나눔고딕 ExtraBold" panose="020D0904000000000000" pitchFamily="50" charset="-127"/>
+                <a:cs typeface="+mj-cs"/>
+              </a:rPr>
+              <a:t>}</a:t>
             </a:r>
             <a:endParaRPr kumimoji="1" lang="ko-KR" altLang="en-US" sz="4000" b="1" i="0" u="none" strike="noStrike" kern="0" cap="none" spc="0" normalizeH="0" baseline="0" noProof="0" dirty="0">
               <a:ln>
@@ -20579,6 +20805,25 @@
               <a:defRPr/>
             </a:pPr>
             <a:r>
+              <a:rPr lang="en-US" altLang="ko-KR" sz="3600" b="1" dirty="0">
+                <a:ln w="19050">
+                  <a:solidFill>
+                    <a:schemeClr val="tx1">
+                      <a:lumMod val="85000"/>
+                      <a:lumOff val="15000"/>
+                    </a:schemeClr>
+                  </a:solidFill>
+                </a:ln>
+                <a:solidFill>
+                  <a:schemeClr val="bg1"/>
+                </a:solidFill>
+                <a:effectLst/>
+                <a:latin typeface="나눔고딕 ExtraBold" panose="020D0904000000000000" pitchFamily="50" charset="-127"/>
+                <a:ea typeface="나눔고딕 ExtraBold" panose="020D0904000000000000" pitchFamily="50" charset="-127"/>
+              </a:rPr>
+              <a:t>{</a:t>
+            </a:r>
+            <a:r>
               <a:rPr lang="en-US" altLang="ko-KR" sz="3600" b="1" dirty="0" err="1">
                 <a:ln w="19050">
                   <a:solidFill>
@@ -20595,7 +20840,26 @@
                 <a:latin typeface="나눔고딕 ExtraBold" panose="020D0904000000000000" pitchFamily="50" charset="-127"/>
                 <a:ea typeface="나눔고딕 ExtraBold" panose="020D0904000000000000" pitchFamily="50" charset="-127"/>
               </a:rPr>
-              <a:t>MK_lyric_text</a:t>
+              <a:t>lyric_text</a:t>
+            </a:r>
+            <a:r>
+              <a:rPr lang="en-US" altLang="ko-KR" sz="3600" b="1" dirty="0">
+                <a:ln w="19050">
+                  <a:solidFill>
+                    <a:schemeClr val="tx1">
+                      <a:lumMod val="85000"/>
+                      <a:lumOff val="15000"/>
+                    </a:schemeClr>
+                  </a:solidFill>
+                </a:ln>
+                <a:solidFill>
+                  <a:schemeClr val="bg1"/>
+                </a:solidFill>
+                <a:effectLst/>
+                <a:latin typeface="나눔고딕 ExtraBold" panose="020D0904000000000000" pitchFamily="50" charset="-127"/>
+                <a:ea typeface="나눔고딕 ExtraBold" panose="020D0904000000000000" pitchFamily="50" charset="-127"/>
+              </a:rPr>
+              <a:t>}</a:t>
             </a:r>
             <a:endParaRPr lang="ko-KR" altLang="en-US" sz="3600" b="1" dirty="0">
               <a:ln w="19050">
@@ -20874,7 +21138,7 @@
               <a:buNone/>
             </a:pPr>
             <a:r>
-              <a:rPr lang="en-US" altLang="ko-KR" sz="4800" b="1" dirty="0" err="1">
+              <a:rPr lang="en-US" altLang="ko-KR" sz="4800" b="1" dirty="0">
                 <a:ln w="19050">
                   <a:solidFill>
                     <a:srgbClr val="000000">
@@ -20898,32 +21162,62 @@
                 <a:latin typeface="나눔고딕 ExtraBold" panose="020D0904000000000000" pitchFamily="50" charset="-127"/>
                 <a:ea typeface="나눔고딕 ExtraBold" panose="020D0904000000000000" pitchFamily="50" charset="-127"/>
               </a:rPr>
-              <a:t>NOTES_intro_announcement</a:t>
-            </a:r>
-            <a:endParaRPr lang="en-US" altLang="ko-KR" sz="4800" b="1" dirty="0">
-              <a:ln w="19050">
-                <a:solidFill>
-                  <a:srgbClr val="000000">
-                    <a:lumMod val="65000"/>
-                    <a:lumOff val="35000"/>
-                  </a:srgbClr>
-                </a:solidFill>
-              </a:ln>
-              <a:solidFill>
-                <a:srgbClr val="FFC000"/>
-              </a:solidFill>
-              <a:effectLst>
-                <a:outerShdw blurRad="76200" dist="63500" dir="2700000" algn="tl" rotWithShape="0">
-                  <a:srgbClr val="000000">
-                    <a:lumMod val="65000"/>
-                    <a:lumOff val="35000"/>
-                    <a:alpha val="40000"/>
-                  </a:srgbClr>
-                </a:outerShdw>
-              </a:effectLst>
-              <a:latin typeface="나눔고딕 ExtraBold" panose="020D0904000000000000" pitchFamily="50" charset="-127"/>
-              <a:ea typeface="나눔고딕 ExtraBold" panose="020D0904000000000000" pitchFamily="50" charset="-127"/>
-            </a:endParaRPr>
+              <a:t>{</a:t>
+            </a:r>
+            <a:r>
+              <a:rPr lang="en-US" altLang="ko-KR" sz="4800" b="1" dirty="0" err="1">
+                <a:ln w="19050">
+                  <a:solidFill>
+                    <a:srgbClr val="000000">
+                      <a:lumMod val="65000"/>
+                      <a:lumOff val="35000"/>
+                    </a:srgbClr>
+                  </a:solidFill>
+                </a:ln>
+                <a:solidFill>
+                  <a:srgbClr val="FFC000"/>
+                </a:solidFill>
+                <a:effectLst>
+                  <a:outerShdw blurRad="76200" dist="63500" dir="2700000" algn="tl" rotWithShape="0">
+                    <a:srgbClr val="000000">
+                      <a:lumMod val="65000"/>
+                      <a:lumOff val="35000"/>
+                      <a:alpha val="40000"/>
+                    </a:srgbClr>
+                  </a:outerShdw>
+                </a:effectLst>
+                <a:latin typeface="나눔고딕 ExtraBold" panose="020D0904000000000000" pitchFamily="50" charset="-127"/>
+                <a:ea typeface="나눔고딕 ExtraBold" panose="020D0904000000000000" pitchFamily="50" charset="-127"/>
+              </a:rPr>
+              <a:t>intro_announcement</a:t>
+            </a:r>
+            <a:r>
+              <a:rPr lang="en-US" altLang="ko-KR" sz="4800" b="1" dirty="0">
+                <a:ln w="19050">
+                  <a:solidFill>
+                    <a:srgbClr val="000000">
+                      <a:lumMod val="65000"/>
+                      <a:lumOff val="35000"/>
+                    </a:srgbClr>
+                  </a:solidFill>
+                </a:ln>
+                <a:solidFill>
+                  <a:srgbClr val="FFC000"/>
+                </a:solidFill>
+                <a:effectLst>
+                  <a:outerShdw blurRad="76200" dist="63500" dir="2700000" algn="tl" rotWithShape="0">
+                    <a:srgbClr val="000000">
+                      <a:lumMod val="65000"/>
+                      <a:lumOff val="35000"/>
+                      <a:alpha val="40000"/>
+                    </a:srgbClr>
+                  </a:outerShdw>
+                </a:effectLst>
+                <a:latin typeface="나눔고딕 ExtraBold" panose="020D0904000000000000" pitchFamily="50" charset="-127"/>
+                <a:ea typeface="나눔고딕 ExtraBold" panose="020D0904000000000000" pitchFamily="50" charset="-127"/>
+              </a:rPr>
+              <a:t>}</a:t>
+            </a:r>
           </a:p>
         </p:txBody>
       </p:sp>
@@ -21490,7 +21784,7 @@
               <a:defRPr/>
             </a:pPr>
             <a:r>
-              <a:rPr kumimoji="1" lang="en-US" altLang="ko-KR" sz="7200" b="1" i="0" u="none" strike="noStrike" kern="0" cap="none" spc="0" normalizeH="0" baseline="0" noProof="0" dirty="0" err="1">
+              <a:rPr kumimoji="1" lang="en-US" altLang="ko-KR" sz="7200" b="1" i="0" u="none" strike="noStrike" kern="0" cap="none" spc="0" normalizeH="0" baseline="0" noProof="0" dirty="0">
                 <a:ln w="19050">
                   <a:solidFill>
                     <a:srgbClr val="000000">
@@ -21517,7 +21811,67 @@
                 <a:ea typeface="나눔고딕 ExtraBold" panose="020D0904000000000000" pitchFamily="50" charset="-127"/>
                 <a:cs typeface="Arial" pitchFamily="34" charset="0"/>
               </a:rPr>
-              <a:t>MK_service_title</a:t>
+              <a:t>{</a:t>
+            </a:r>
+            <a:r>
+              <a:rPr kumimoji="1" lang="en-US" altLang="ko-KR" sz="7200" b="1" i="0" u="none" strike="noStrike" kern="0" cap="none" spc="0" normalizeH="0" baseline="0" noProof="0" dirty="0" err="1">
+                <a:ln w="19050">
+                  <a:solidFill>
+                    <a:srgbClr val="000000">
+                      <a:lumMod val="65000"/>
+                      <a:lumOff val="35000"/>
+                    </a:srgbClr>
+                  </a:solidFill>
+                </a:ln>
+                <a:solidFill>
+                  <a:srgbClr val="FFC000"/>
+                </a:solidFill>
+                <a:effectLst>
+                  <a:outerShdw blurRad="76200" dist="63500" dir="2700000" algn="tl" rotWithShape="0">
+                    <a:srgbClr val="000000">
+                      <a:lumMod val="65000"/>
+                      <a:lumOff val="35000"/>
+                      <a:alpha val="40000"/>
+                    </a:srgbClr>
+                  </a:outerShdw>
+                </a:effectLst>
+                <a:uLnTx/>
+                <a:uFillTx/>
+                <a:latin typeface="나눔고딕 ExtraBold" panose="020D0904000000000000" pitchFamily="50" charset="-127"/>
+                <a:ea typeface="나눔고딕 ExtraBold" panose="020D0904000000000000" pitchFamily="50" charset="-127"/>
+                <a:cs typeface="Arial" pitchFamily="34" charset="0"/>
+              </a:rPr>
+              <a:t>service_title</a:t>
+            </a:r>
+            <a:r>
+              <a:rPr kumimoji="1" lang="en-US" altLang="ko-KR" sz="7200" b="1" i="0" u="none" strike="noStrike" kern="0" cap="none" spc="0" normalizeH="0" baseline="0" noProof="0" dirty="0">
+                <a:ln w="19050">
+                  <a:solidFill>
+                    <a:srgbClr val="000000">
+                      <a:lumMod val="65000"/>
+                      <a:lumOff val="35000"/>
+                    </a:srgbClr>
+                  </a:solidFill>
+                </a:ln>
+                <a:solidFill>
+                  <a:srgbClr val="FFC000"/>
+                </a:solidFill>
+                <a:effectLst>
+                  <a:outerShdw blurRad="76200" dist="63500" dir="2700000" algn="tl" rotWithShape="0">
+                    <a:srgbClr val="000000">
+                      <a:lumMod val="65000"/>
+                      <a:lumOff val="35000"/>
+                      <a:alpha val="40000"/>
+                    </a:srgbClr>
+                  </a:outerShdw>
+                </a:effectLst>
+                <a:uLnTx/>
+                <a:uFillTx/>
+                <a:latin typeface="나눔고딕 ExtraBold" panose="020D0904000000000000" pitchFamily="50" charset="-127"/>
+                <a:ea typeface="나눔고딕 ExtraBold" panose="020D0904000000000000" pitchFamily="50" charset="-127"/>
+                <a:cs typeface="Arial" pitchFamily="34" charset="0"/>
+              </a:rPr>
+              <a:t>}</a:t>
             </a:r>
             <a:endParaRPr kumimoji="1" lang="ko-KR" altLang="en-US" sz="7200" b="1" i="0" u="none" strike="noStrike" kern="0" cap="none" spc="0" normalizeH="0" baseline="0" noProof="0" dirty="0">
               <a:ln w="19050">
@@ -21610,7 +21964,7 @@
                 <a:ea typeface="나눔고딕 ExtraBold" panose="020D0904000000000000" pitchFamily="50" charset="-127"/>
                 <a:cs typeface="Arial" pitchFamily="34" charset="0"/>
               </a:rPr>
-              <a:t>“</a:t>
+              <a:t>“{</a:t>
             </a:r>
             <a:r>
               <a:rPr kumimoji="1" lang="en-US" altLang="ko-KR" sz="3600" b="0" i="0" u="none" strike="noStrike" kern="1200" cap="none" spc="0" normalizeH="0" baseline="0" noProof="0" dirty="0" err="1">
@@ -21634,7 +21988,7 @@
                 <a:ea typeface="나눔고딕 ExtraBold" panose="020D0904000000000000" pitchFamily="50" charset="-127"/>
                 <a:cs typeface="Arial" pitchFamily="34" charset="0"/>
               </a:rPr>
-              <a:t>MK_sermon_title</a:t>
+              <a:t>sermon_title</a:t>
             </a:r>
             <a:r>
               <a:rPr kumimoji="1" lang="en-US" altLang="ko-KR" sz="3600" b="0" i="0" u="none" strike="noStrike" kern="1200" cap="none" spc="0" normalizeH="0" baseline="0" noProof="0" dirty="0">
@@ -21658,7 +22012,7 @@
                 <a:ea typeface="나눔고딕 ExtraBold" panose="020D0904000000000000" pitchFamily="50" charset="-127"/>
                 <a:cs typeface="Arial" pitchFamily="34" charset="0"/>
               </a:rPr>
-              <a:t>”</a:t>
+              <a:t>}”</a:t>
             </a:r>
           </a:p>
           <a:p>
@@ -21701,7 +22055,7 @@
                 <a:ea typeface="나눔고딕 ExtraBold" panose="020D0904000000000000" pitchFamily="50" charset="-127"/>
                 <a:cs typeface="Arial" pitchFamily="34" charset="0"/>
               </a:rPr>
-              <a:t>&lt;</a:t>
+              <a:t>&lt;{</a:t>
             </a:r>
             <a:r>
               <a:rPr kumimoji="1" lang="en-US" altLang="ko-KR" sz="3300" b="1" i="0" u="none" strike="noStrike" kern="1200" cap="none" spc="0" normalizeH="0" baseline="0" noProof="0" dirty="0" err="1">
@@ -21725,7 +22079,7 @@
                 <a:ea typeface="나눔고딕 ExtraBold" panose="020D0904000000000000" pitchFamily="50" charset="-127"/>
                 <a:cs typeface="Arial" pitchFamily="34" charset="0"/>
               </a:rPr>
-              <a:t>MK_bible_verse</a:t>
+              <a:t>bible_verse</a:t>
             </a:r>
             <a:r>
               <a:rPr kumimoji="1" lang="en-US" altLang="ko-KR" sz="3300" b="1" i="0" u="none" strike="noStrike" kern="1200" cap="none" spc="0" normalizeH="0" baseline="0" noProof="0" dirty="0">
@@ -21749,7 +22103,7 @@
                 <a:ea typeface="나눔고딕 ExtraBold" panose="020D0904000000000000" pitchFamily="50" charset="-127"/>
                 <a:cs typeface="Arial" pitchFamily="34" charset="0"/>
               </a:rPr>
-              <a:t>&gt;</a:t>
+              <a:t>}&gt;</a:t>
             </a:r>
           </a:p>
         </p:txBody>
@@ -21764,8 +22118,8 @@
         </p:nvSpPr>
         <p:spPr bwMode="auto">
           <a:xfrm>
-            <a:off x="6096000" y="113438"/>
-            <a:ext cx="3810000" cy="584775"/>
+            <a:off x="5181600" y="113438"/>
+            <a:ext cx="4724400" cy="584775"/>
           </a:xfrm>
           <a:prstGeom prst="rect">
             <a:avLst/>
@@ -21813,7 +22167,7 @@
               <a:defRPr/>
             </a:pPr>
             <a:r>
-              <a:rPr kumimoji="1" lang="en-US" altLang="ko-KR" sz="3200" b="1" i="0" u="none" strike="noStrike" kern="1200" cap="none" spc="0" normalizeH="0" baseline="0" noProof="0" dirty="0" err="1">
+              <a:rPr kumimoji="1" lang="en-US" altLang="ko-KR" sz="3200" b="1" i="0" u="none" strike="noStrike" kern="1200" cap="none" spc="0" normalizeH="0" baseline="0" noProof="0" dirty="0">
                 <a:ln>
                   <a:noFill/>
                 </a:ln>
@@ -21831,26 +22185,8 @@
                 <a:ea typeface="나눔고딕" panose="020D0604000000000000" pitchFamily="50" charset="-127"/>
                 <a:cs typeface="Arial" pitchFamily="34" charset="0"/>
               </a:rPr>
-              <a:t>MK_date</a:t>
-            </a:r>
-            <a:endParaRPr kumimoji="1" lang="en-US" altLang="ko-KR" sz="3200" b="1" i="0" u="none" strike="noStrike" kern="1200" cap="none" spc="0" normalizeH="0" baseline="0" noProof="0" dirty="0">
-              <a:ln>
-                <a:noFill/>
-              </a:ln>
-              <a:solidFill>
-                <a:srgbClr val="FFFF00"/>
-              </a:solidFill>
-              <a:effectLst>
-                <a:outerShdw blurRad="38100" dist="38100" dir="2700000" algn="tl">
-                  <a:srgbClr val="C0C0C0"/>
-                </a:outerShdw>
-              </a:effectLst>
-              <a:uLnTx/>
-              <a:uFillTx/>
-              <a:latin typeface="나눔고딕" panose="020D0604000000000000" pitchFamily="50" charset="-127"/>
-              <a:ea typeface="나눔고딕" panose="020D0604000000000000" pitchFamily="50" charset="-127"/>
-              <a:cs typeface="Arial" pitchFamily="34" charset="0"/>
-            </a:endParaRPr>
+              <a:t>{datetime:%Y-%m-%d}</a:t>
+            </a:r>
           </a:p>
         </p:txBody>
       </p:sp>
@@ -22200,7 +22536,7 @@
               <a:defRPr/>
             </a:pPr>
             <a:r>
-              <a:rPr lang="en-US" altLang="ko-KR" sz="3200" b="1" dirty="0" err="1">
+              <a:rPr lang="en-US" altLang="ko-KR" sz="3200" b="1" dirty="0">
                 <a:solidFill>
                   <a:schemeClr val="tx1">
                     <a:lumMod val="85000"/>
@@ -22217,7 +22553,47 @@
                 <a:latin typeface="나눔고딕 ExtraBold" panose="020D0904000000000000" pitchFamily="50" charset="-127"/>
                 <a:ea typeface="나눔고딕 ExtraBold" panose="020D0904000000000000" pitchFamily="50" charset="-127"/>
               </a:rPr>
-              <a:t>MK_lyric_text</a:t>
+              <a:t>{</a:t>
+            </a:r>
+            <a:r>
+              <a:rPr lang="en-US" altLang="ko-KR" sz="3200" b="1" dirty="0" err="1">
+                <a:solidFill>
+                  <a:schemeClr val="tx1">
+                    <a:lumMod val="85000"/>
+                    <a:lumOff val="15000"/>
+                  </a:schemeClr>
+                </a:solidFill>
+                <a:effectLst>
+                  <a:outerShdw blurRad="50800" dist="38100" dir="2700000" algn="tl" rotWithShape="0">
+                    <a:prstClr val="black">
+                      <a:alpha val="40000"/>
+                    </a:prstClr>
+                  </a:outerShdw>
+                </a:effectLst>
+                <a:latin typeface="나눔고딕 ExtraBold" panose="020D0904000000000000" pitchFamily="50" charset="-127"/>
+                <a:ea typeface="나눔고딕 ExtraBold" panose="020D0904000000000000" pitchFamily="50" charset="-127"/>
+              </a:rPr>
+              <a:t>lyric_text</a:t>
+            </a:r>
+            <a:r>
+              <a:rPr lang="en-US" altLang="ko-KR" sz="3200" b="1" dirty="0">
+                <a:solidFill>
+                  <a:schemeClr val="tx1">
+                    <a:lumMod val="85000"/>
+                    <a:lumOff val="15000"/>
+                  </a:schemeClr>
+                </a:solidFill>
+                <a:effectLst>
+                  <a:outerShdw blurRad="50800" dist="38100" dir="2700000" algn="tl" rotWithShape="0">
+                    <a:prstClr val="black">
+                      <a:alpha val="40000"/>
+                    </a:prstClr>
+                  </a:outerShdw>
+                </a:effectLst>
+                <a:latin typeface="나눔고딕 ExtraBold" panose="020D0904000000000000" pitchFamily="50" charset="-127"/>
+                <a:ea typeface="나눔고딕 ExtraBold" panose="020D0904000000000000" pitchFamily="50" charset="-127"/>
+              </a:rPr>
+              <a:t>}</a:t>
             </a:r>
             <a:endParaRPr lang="ko-KR" altLang="en-US" sz="3200" b="1" dirty="0">
               <a:solidFill>
@@ -22807,7 +23183,7 @@
               <a:defRPr/>
             </a:pPr>
             <a:r>
-              <a:rPr kumimoji="1" lang="en-US" altLang="ko-KR" sz="3200" b="1" i="0" u="none" strike="noStrike" kern="1200" cap="none" spc="-150" normalizeH="0" baseline="0" noProof="0" dirty="0" err="1">
+              <a:rPr kumimoji="1" lang="en-US" altLang="ko-KR" sz="3200" b="1" i="0" u="none" strike="noStrike" kern="1200" cap="none" spc="-150" normalizeH="0" baseline="0" noProof="0" dirty="0">
                 <a:ln>
                   <a:noFill/>
                 </a:ln>
@@ -22827,7 +23203,53 @@
                 <a:ea typeface="나눔고딕 ExtraBold" panose="020D0904000000000000" pitchFamily="50" charset="-127"/>
                 <a:cs typeface="+mj-cs"/>
               </a:rPr>
-              <a:t>MK_sermon_title</a:t>
+              <a:t>{</a:t>
+            </a:r>
+            <a:r>
+              <a:rPr kumimoji="1" lang="en-US" altLang="ko-KR" sz="3200" b="1" i="0" u="none" strike="noStrike" kern="1200" cap="none" spc="-150" normalizeH="0" baseline="0" noProof="0" dirty="0" err="1">
+                <a:ln>
+                  <a:noFill/>
+                </a:ln>
+                <a:solidFill>
+                  <a:srgbClr val="0070C0"/>
+                </a:solidFill>
+                <a:effectLst>
+                  <a:outerShdw blurRad="50800" dist="38100" dir="2700000" algn="tl" rotWithShape="0">
+                    <a:prstClr val="black">
+                      <a:alpha val="40000"/>
+                    </a:prstClr>
+                  </a:outerShdw>
+                </a:effectLst>
+                <a:uLnTx/>
+                <a:uFillTx/>
+                <a:latin typeface="나눔고딕 ExtraBold" panose="020D0904000000000000" pitchFamily="50" charset="-127"/>
+                <a:ea typeface="나눔고딕 ExtraBold" panose="020D0904000000000000" pitchFamily="50" charset="-127"/>
+                <a:cs typeface="+mj-cs"/>
+              </a:rPr>
+              <a:t>sermon_title</a:t>
+            </a:r>
+            <a:r>
+              <a:rPr kumimoji="1" lang="en-US" altLang="ko-KR" sz="3200" b="1" i="0" u="none" strike="noStrike" kern="1200" cap="none" spc="-150" normalizeH="0" baseline="0" noProof="0" dirty="0">
+                <a:ln>
+                  <a:noFill/>
+                </a:ln>
+                <a:solidFill>
+                  <a:srgbClr val="0070C0"/>
+                </a:solidFill>
+                <a:effectLst>
+                  <a:outerShdw blurRad="50800" dist="38100" dir="2700000" algn="tl" rotWithShape="0">
+                    <a:prstClr val="black">
+                      <a:alpha val="40000"/>
+                    </a:prstClr>
+                  </a:outerShdw>
+                </a:effectLst>
+                <a:uLnTx/>
+                <a:uFillTx/>
+                <a:latin typeface="나눔고딕 ExtraBold" panose="020D0904000000000000" pitchFamily="50" charset="-127"/>
+                <a:ea typeface="나눔고딕 ExtraBold" panose="020D0904000000000000" pitchFamily="50" charset="-127"/>
+                <a:cs typeface="+mj-cs"/>
+              </a:rPr>
+              <a:t>}</a:t>
             </a:r>
             <a:endParaRPr kumimoji="1" lang="ko-KR" altLang="en-US" sz="3200" b="1" i="0" u="none" strike="noStrike" kern="1200" cap="none" spc="-150" normalizeH="0" baseline="0" noProof="0" dirty="0">
               <a:ln>
@@ -23063,7 +23485,7 @@
               <a:defRPr/>
             </a:pPr>
             <a:r>
-              <a:rPr kumimoji="1" lang="en-US" altLang="ko-KR" sz="2400" b="1" i="0" u="none" strike="noStrike" kern="1200" cap="none" spc="-150" normalizeH="0" baseline="0" noProof="0" dirty="0" err="1">
+              <a:rPr kumimoji="1" lang="en-US" altLang="ko-KR" sz="2400" b="1" i="0" u="none" strike="noStrike" kern="1200" cap="none" spc="-150" normalizeH="0" baseline="0" noProof="0" dirty="0">
                 <a:ln>
                   <a:noFill/>
                 </a:ln>
@@ -23082,27 +23504,8 @@
                 <a:latin typeface="나눔고딕 ExtraBold" panose="020D0904000000000000" pitchFamily="50" charset="-127"/>
                 <a:ea typeface="나눔고딕 ExtraBold" panose="020D0904000000000000" pitchFamily="50" charset="-127"/>
               </a:rPr>
-              <a:t>MK_preacher</a:t>
-            </a:r>
-            <a:endParaRPr kumimoji="1" lang="en-US" altLang="ko-KR" sz="2400" b="1" i="0" u="none" strike="noStrike" kern="1200" cap="none" spc="-150" normalizeH="0" baseline="0" noProof="0" dirty="0">
-              <a:ln>
-                <a:noFill/>
-              </a:ln>
-              <a:solidFill>
-                <a:srgbClr val="F0F0F0"/>
-              </a:solidFill>
-              <a:effectLst>
-                <a:outerShdw blurRad="50800" dist="38100" dir="2700000" algn="tl" rotWithShape="0">
-                  <a:prstClr val="black">
-                    <a:alpha val="40000"/>
-                  </a:prstClr>
-                </a:outerShdw>
-              </a:effectLst>
-              <a:uLnTx/>
-              <a:uFillTx/>
-              <a:latin typeface="나눔고딕 ExtraBold" panose="020D0904000000000000" pitchFamily="50" charset="-127"/>
-              <a:ea typeface="나눔고딕 ExtraBold" panose="020D0904000000000000" pitchFamily="50" charset="-127"/>
-            </a:endParaRPr>
+              <a:t>{preacher}</a:t>
+            </a:r>
           </a:p>
         </p:txBody>
       </p:sp>
@@ -23791,7 +24194,7 @@
               <a:defRPr/>
             </a:pPr>
             <a:r>
-              <a:rPr kumimoji="1" lang="en-US" altLang="ko-KR" sz="3200" b="1" i="0" u="none" strike="noStrike" kern="1200" cap="none" spc="0" normalizeH="0" baseline="0" noProof="0" dirty="0" err="1">
+              <a:rPr kumimoji="1" lang="en-US" altLang="ko-KR" sz="3200" b="1" i="0" u="none" strike="noStrike" kern="1200" cap="none" spc="0" normalizeH="0" baseline="0" noProof="0" dirty="0">
                 <a:ln>
                   <a:noFill/>
                 </a:ln>
@@ -23805,22 +24208,42 @@
                 <a:ea typeface="나눔고딕 ExtraBold" panose="020D0904000000000000" pitchFamily="50" charset="-127"/>
                 <a:cs typeface="Arial" pitchFamily="34" charset="0"/>
               </a:rPr>
-              <a:t>MK_bible_verse</a:t>
-            </a:r>
-            <a:endParaRPr kumimoji="1" lang="en-US" altLang="ko-KR" sz="3200" b="1" i="0" u="none" strike="noStrike" kern="1200" cap="none" spc="0" normalizeH="0" baseline="0" noProof="0" dirty="0">
-              <a:ln>
-                <a:noFill/>
-              </a:ln>
-              <a:solidFill>
-                <a:srgbClr val="F0F0F0"/>
-              </a:solidFill>
-              <a:effectLst/>
-              <a:uLnTx/>
-              <a:uFillTx/>
-              <a:latin typeface="나눔고딕 ExtraBold" panose="020D0904000000000000" pitchFamily="50" charset="-127"/>
-              <a:ea typeface="나눔고딕 ExtraBold" panose="020D0904000000000000" pitchFamily="50" charset="-127"/>
-              <a:cs typeface="Arial" pitchFamily="34" charset="0"/>
-            </a:endParaRPr>
+              <a:t>{</a:t>
+            </a:r>
+            <a:r>
+              <a:rPr kumimoji="1" lang="en-US" altLang="ko-KR" sz="3200" b="1" i="0" u="none" strike="noStrike" kern="1200" cap="none" spc="0" normalizeH="0" baseline="0" noProof="0" dirty="0" err="1">
+                <a:ln>
+                  <a:noFill/>
+                </a:ln>
+                <a:solidFill>
+                  <a:srgbClr val="F0F0F0"/>
+                </a:solidFill>
+                <a:effectLst/>
+                <a:uLnTx/>
+                <a:uFillTx/>
+                <a:latin typeface="나눔고딕 ExtraBold" panose="020D0904000000000000" pitchFamily="50" charset="-127"/>
+                <a:ea typeface="나눔고딕 ExtraBold" panose="020D0904000000000000" pitchFamily="50" charset="-127"/>
+                <a:cs typeface="Arial" pitchFamily="34" charset="0"/>
+              </a:rPr>
+              <a:t>bible_verse</a:t>
+            </a:r>
+            <a:r>
+              <a:rPr kumimoji="1" lang="en-US" altLang="ko-KR" sz="3200" b="1" i="0" u="none" strike="noStrike" kern="1200" cap="none" spc="0" normalizeH="0" baseline="0" noProof="0" dirty="0">
+                <a:ln>
+                  <a:noFill/>
+                </a:ln>
+                <a:solidFill>
+                  <a:srgbClr val="F0F0F0"/>
+                </a:solidFill>
+                <a:effectLst/>
+                <a:uLnTx/>
+                <a:uFillTx/>
+                <a:latin typeface="나눔고딕 ExtraBold" panose="020D0904000000000000" pitchFamily="50" charset="-127"/>
+                <a:ea typeface="나눔고딕 ExtraBold" panose="020D0904000000000000" pitchFamily="50" charset="-127"/>
+                <a:cs typeface="Arial" pitchFamily="34" charset="0"/>
+              </a:rPr>
+              <a:t>}</a:t>
+            </a:r>
           </a:p>
         </p:txBody>
       </p:sp>

</xml_diff>